<commit_message>
security html, techer notes
</commit_message>
<xml_diff>
--- a/SHIFT4IT/security-and-privacy/security-and-privacy.pptx
+++ b/SHIFT4IT/security-and-privacy/security-and-privacy.pptx
@@ -208,7 +208,7 @@
           <a:p>
             <a:fld id="{2C027FDF-D9AC-4497-8AF1-9347ACD4697E}" type="datetimeFigureOut">
               <a:rPr lang="hr-HR" smtClean="0"/>
-              <a:t>13.3.2025.</a:t>
+              <a:t>16.4.2025.</a:t>
             </a:fld>
             <a:endParaRPr lang="hr-HR"/>
           </a:p>
@@ -474,6 +474,1370 @@
     </a:lvl9pPr>
   </p:notesStyle>
 </p:notesMaster>
+</file>
+
+<file path=ppt/notesSlides/notesSlide1.xml><?xml version="1.0" encoding="utf-8"?>
+<p:notes xmlns:a="http://schemas.openxmlformats.org/drawingml/2006/main" xmlns:r="http://schemas.openxmlformats.org/officeDocument/2006/relationships" xmlns:p="http://schemas.openxmlformats.org/presentationml/2006/main">
+  <p:cSld>
+    <p:spTree>
+      <p:nvGrpSpPr>
+        <p:cNvPr id="1" name=""/>
+        <p:cNvGrpSpPr/>
+        <p:nvPr/>
+      </p:nvGrpSpPr>
+      <p:grpSpPr>
+        <a:xfrm>
+          <a:off x="0" y="0"/>
+          <a:ext cx="0" cy="0"/>
+          <a:chOff x="0" y="0"/>
+          <a:chExt cx="0" cy="0"/>
+        </a:xfrm>
+      </p:grpSpPr>
+      <p:sp>
+        <p:nvSpPr>
+          <p:cNvPr id="2" name="Slide Image Placeholder 1"/>
+          <p:cNvSpPr>
+            <a:spLocks noGrp="1" noRot="1" noChangeAspect="1"/>
+          </p:cNvSpPr>
+          <p:nvPr>
+            <p:ph type="sldImg"/>
+          </p:nvPr>
+        </p:nvSpPr>
+        <p:spPr/>
+      </p:sp>
+      <p:sp>
+        <p:nvSpPr>
+          <p:cNvPr id="3" name="Notes Placeholder 2"/>
+          <p:cNvSpPr>
+            <a:spLocks noGrp="1"/>
+          </p:cNvSpPr>
+          <p:nvPr>
+            <p:ph type="body" idx="1"/>
+          </p:nvPr>
+        </p:nvSpPr>
+        <p:spPr/>
+        <p:txBody>
+          <a:bodyPr/>
+          <a:lstStyle/>
+          <a:p>
+            <a:pPr>
+              <a:buFont typeface="Arial" panose="020B0604020202020204" pitchFamily="34" charset="0"/>
+              <a:buChar char="•"/>
+            </a:pPr>
+            <a:r>
+              <a:rPr lang="en-US" b="1" dirty="0"/>
+              <a:t>Teacher Notes:</a:t>
+            </a:r>
+            <a:endParaRPr lang="en-US" dirty="0"/>
+          </a:p>
+          <a:p>
+            <a:pPr marL="742950" lvl="1" indent="-285750">
+              <a:buFont typeface="Arial" panose="020B0604020202020204" pitchFamily="34" charset="0"/>
+              <a:buChar char="•"/>
+            </a:pPr>
+            <a:r>
+              <a:rPr lang="en-US" dirty="0"/>
+              <a:t>Start with a discussion on real-world examples (recent high-profile breaches) to illustrate how lack of security can affect organizations both financially and reputationally.</a:t>
+            </a:r>
+          </a:p>
+          <a:p>
+            <a:pPr marL="742950" lvl="1" indent="-285750">
+              <a:buFont typeface="Arial" panose="020B0604020202020204" pitchFamily="34" charset="0"/>
+              <a:buChar char="•"/>
+            </a:pPr>
+            <a:r>
+              <a:rPr lang="en-US" dirty="0"/>
+              <a:t>Emphasize the role of cybersecurity awareness in all departments of an organization.</a:t>
+            </a:r>
+          </a:p>
+          <a:p>
+            <a:pPr marL="742950" lvl="1" indent="-285750">
+              <a:buFont typeface="Arial" panose="020B0604020202020204" pitchFamily="34" charset="0"/>
+              <a:buChar char="•"/>
+            </a:pPr>
+            <a:r>
+              <a:rPr lang="en-US" dirty="0"/>
+              <a:t>Explain why security and privacy are not just IT issues but are central to corporate governance and risk management.</a:t>
+            </a:r>
+          </a:p>
+          <a:p>
+            <a:pPr>
+              <a:buFont typeface="Arial" panose="020B0604020202020204" pitchFamily="34" charset="0"/>
+              <a:buChar char="•"/>
+            </a:pPr>
+            <a:r>
+              <a:rPr lang="en-US" b="1" dirty="0"/>
+              <a:t>Resources:</a:t>
+            </a:r>
+            <a:endParaRPr lang="en-US" dirty="0"/>
+          </a:p>
+          <a:p>
+            <a:pPr marL="742950" lvl="1" indent="-285750">
+              <a:buFont typeface="Arial" panose="020B0604020202020204" pitchFamily="34" charset="0"/>
+              <a:buChar char="•"/>
+            </a:pPr>
+            <a:r>
+              <a:rPr lang="en-US" dirty="0"/>
+              <a:t>A basic primer video or interactive module on cybersecurity fundamentals from organizations such as NIST or SANS Institute.</a:t>
+            </a:r>
+          </a:p>
+          <a:p>
+            <a:pPr marL="742950" lvl="1" indent="-285750">
+              <a:buFont typeface="Arial" panose="020B0604020202020204" pitchFamily="34" charset="0"/>
+              <a:buChar char="•"/>
+            </a:pPr>
+            <a:r>
+              <a:rPr lang="en-US" dirty="0"/>
+              <a:t>Infographics or news articles that highlight trends in cyberattacks and breaches.</a:t>
+            </a:r>
+          </a:p>
+          <a:p>
+            <a:pPr>
+              <a:buFont typeface="Arial" panose="020B0604020202020204" pitchFamily="34" charset="0"/>
+              <a:buChar char="•"/>
+            </a:pPr>
+            <a:r>
+              <a:rPr lang="en-US" b="1" dirty="0"/>
+              <a:t>Additional Reading:</a:t>
+            </a:r>
+            <a:endParaRPr lang="en-US" dirty="0"/>
+          </a:p>
+          <a:p>
+            <a:pPr marL="742950" lvl="1" indent="-285750">
+              <a:buFont typeface="Arial" panose="020B0604020202020204" pitchFamily="34" charset="0"/>
+              <a:buChar char="•"/>
+            </a:pPr>
+            <a:r>
+              <a:rPr lang="en-US" dirty="0"/>
+              <a:t>“Cybersecurity 101” articles or introductory chapters from textbooks like </a:t>
+            </a:r>
+            <a:r>
+              <a:rPr lang="en-US" i="1" dirty="0"/>
+              <a:t>Cybersecurity and Cyberwar: What Everyone Needs to Know</a:t>
+            </a:r>
+            <a:r>
+              <a:rPr lang="en-US" dirty="0"/>
+              <a:t> by P. W. Singer and Allan Friedman.</a:t>
+            </a:r>
+          </a:p>
+          <a:p>
+            <a:endParaRPr lang="hr-HR" dirty="0"/>
+          </a:p>
+        </p:txBody>
+      </p:sp>
+      <p:sp>
+        <p:nvSpPr>
+          <p:cNvPr id="4" name="Slide Number Placeholder 3"/>
+          <p:cNvSpPr>
+            <a:spLocks noGrp="1"/>
+          </p:cNvSpPr>
+          <p:nvPr>
+            <p:ph type="sldNum" sz="quarter" idx="5"/>
+          </p:nvPr>
+        </p:nvSpPr>
+        <p:spPr/>
+        <p:txBody>
+          <a:bodyPr/>
+          <a:lstStyle/>
+          <a:p>
+            <a:fld id="{90A064B2-EFF6-4760-BE09-0DEDA56827BE}" type="slidenum">
+              <a:rPr lang="hr-HR" smtClean="0"/>
+              <a:t>2</a:t>
+            </a:fld>
+            <a:endParaRPr lang="hr-HR"/>
+          </a:p>
+        </p:txBody>
+      </p:sp>
+    </p:spTree>
+    <p:extLst>
+      <p:ext uri="{BB962C8B-B14F-4D97-AF65-F5344CB8AC3E}">
+        <p14:creationId xmlns:p14="http://schemas.microsoft.com/office/powerpoint/2010/main" val="205634104"/>
+      </p:ext>
+    </p:extLst>
+  </p:cSld>
+  <p:clrMapOvr>
+    <a:masterClrMapping/>
+  </p:clrMapOvr>
+</p:notes>
+</file>
+
+<file path=ppt/notesSlides/notesSlide2.xml><?xml version="1.0" encoding="utf-8"?>
+<p:notes xmlns:a="http://schemas.openxmlformats.org/drawingml/2006/main" xmlns:r="http://schemas.openxmlformats.org/officeDocument/2006/relationships" xmlns:p="http://schemas.openxmlformats.org/presentationml/2006/main">
+  <p:cSld>
+    <p:spTree>
+      <p:nvGrpSpPr>
+        <p:cNvPr id="1" name=""/>
+        <p:cNvGrpSpPr/>
+        <p:nvPr/>
+      </p:nvGrpSpPr>
+      <p:grpSpPr>
+        <a:xfrm>
+          <a:off x="0" y="0"/>
+          <a:ext cx="0" cy="0"/>
+          <a:chOff x="0" y="0"/>
+          <a:chExt cx="0" cy="0"/>
+        </a:xfrm>
+      </p:grpSpPr>
+      <p:sp>
+        <p:nvSpPr>
+          <p:cNvPr id="2" name="Slide Image Placeholder 1"/>
+          <p:cNvSpPr>
+            <a:spLocks noGrp="1" noRot="1" noChangeAspect="1"/>
+          </p:cNvSpPr>
+          <p:nvPr>
+            <p:ph type="sldImg"/>
+          </p:nvPr>
+        </p:nvSpPr>
+        <p:spPr/>
+      </p:sp>
+      <p:sp>
+        <p:nvSpPr>
+          <p:cNvPr id="3" name="Notes Placeholder 2"/>
+          <p:cNvSpPr>
+            <a:spLocks noGrp="1"/>
+          </p:cNvSpPr>
+          <p:nvPr>
+            <p:ph type="body" idx="1"/>
+          </p:nvPr>
+        </p:nvSpPr>
+        <p:spPr/>
+        <p:txBody>
+          <a:bodyPr/>
+          <a:lstStyle/>
+          <a:p>
+            <a:pPr>
+              <a:buNone/>
+            </a:pPr>
+            <a:r>
+              <a:rPr lang="en-US" b="1" dirty="0"/>
+              <a:t>Teacher Notes:</a:t>
+            </a:r>
+            <a:endParaRPr lang="en-US" dirty="0"/>
+          </a:p>
+          <a:p>
+            <a:pPr>
+              <a:buFont typeface="Arial" panose="020B0604020202020204" pitchFamily="34" charset="0"/>
+              <a:buChar char="•"/>
+            </a:pPr>
+            <a:r>
+              <a:rPr lang="en-US" dirty="0"/>
+              <a:t>Walk through each element of the CIA triad with practical examples. For instance, explain how encryption (for confidentiality), digital signatures (for integrity), and redundant systems (for availability) each play a role.</a:t>
+            </a:r>
+          </a:p>
+          <a:p>
+            <a:pPr>
+              <a:buFont typeface="Arial" panose="020B0604020202020204" pitchFamily="34" charset="0"/>
+              <a:buChar char="•"/>
+            </a:pPr>
+            <a:r>
+              <a:rPr lang="en-US" dirty="0"/>
+              <a:t>Consider using a short in-class activity where students classify different security scenarios under the correct pillar.</a:t>
+            </a:r>
+          </a:p>
+          <a:p>
+            <a:pPr>
+              <a:buNone/>
+            </a:pPr>
+            <a:r>
+              <a:rPr lang="en-US" b="1" dirty="0"/>
+              <a:t>Resources:</a:t>
+            </a:r>
+            <a:endParaRPr lang="en-US" dirty="0"/>
+          </a:p>
+          <a:p>
+            <a:pPr>
+              <a:buFont typeface="Arial" panose="020B0604020202020204" pitchFamily="34" charset="0"/>
+              <a:buChar char="•"/>
+            </a:pPr>
+            <a:r>
+              <a:rPr lang="en-US" dirty="0"/>
+              <a:t>Official documents or guides on the CIA model from reputable bodies such as NIST’s Cybersecurity Framework.</a:t>
+            </a:r>
+          </a:p>
+          <a:p>
+            <a:pPr>
+              <a:buFont typeface="Arial" panose="020B0604020202020204" pitchFamily="34" charset="0"/>
+              <a:buChar char="•"/>
+            </a:pPr>
+            <a:r>
+              <a:rPr lang="en-US" dirty="0"/>
+              <a:t>Online interactive tools or simulations that visually demonstrate the principles of confidentiality, integrity, and availability.</a:t>
+            </a:r>
+          </a:p>
+          <a:p>
+            <a:pPr>
+              <a:buNone/>
+            </a:pPr>
+            <a:r>
+              <a:rPr lang="en-US" b="1" dirty="0"/>
+              <a:t>Additional Reading:</a:t>
+            </a:r>
+          </a:p>
+          <a:p>
+            <a:pPr>
+              <a:buNone/>
+            </a:pPr>
+            <a:r>
+              <a:rPr lang="en-US" dirty="0"/>
+              <a:t>Articles or textbook chapters discussing the evolution of the CIA triad and its application in modern networks.</a:t>
+            </a:r>
+          </a:p>
+          <a:p>
+            <a:endParaRPr lang="hr-HR" dirty="0"/>
+          </a:p>
+        </p:txBody>
+      </p:sp>
+      <p:sp>
+        <p:nvSpPr>
+          <p:cNvPr id="4" name="Slide Number Placeholder 3"/>
+          <p:cNvSpPr>
+            <a:spLocks noGrp="1"/>
+          </p:cNvSpPr>
+          <p:nvPr>
+            <p:ph type="sldNum" sz="quarter" idx="5"/>
+          </p:nvPr>
+        </p:nvSpPr>
+        <p:spPr/>
+        <p:txBody>
+          <a:bodyPr/>
+          <a:lstStyle/>
+          <a:p>
+            <a:fld id="{90A064B2-EFF6-4760-BE09-0DEDA56827BE}" type="slidenum">
+              <a:rPr lang="hr-HR" smtClean="0"/>
+              <a:t>3</a:t>
+            </a:fld>
+            <a:endParaRPr lang="hr-HR"/>
+          </a:p>
+        </p:txBody>
+      </p:sp>
+    </p:spTree>
+    <p:extLst>
+      <p:ext uri="{BB962C8B-B14F-4D97-AF65-F5344CB8AC3E}">
+        <p14:creationId xmlns:p14="http://schemas.microsoft.com/office/powerpoint/2010/main" val="578534746"/>
+      </p:ext>
+    </p:extLst>
+  </p:cSld>
+  <p:clrMapOvr>
+    <a:masterClrMapping/>
+  </p:clrMapOvr>
+</p:notes>
+</file>
+
+<file path=ppt/notesSlides/notesSlide3.xml><?xml version="1.0" encoding="utf-8"?>
+<p:notes xmlns:a="http://schemas.openxmlformats.org/drawingml/2006/main" xmlns:r="http://schemas.openxmlformats.org/officeDocument/2006/relationships" xmlns:p="http://schemas.openxmlformats.org/presentationml/2006/main">
+  <p:cSld>
+    <p:spTree>
+      <p:nvGrpSpPr>
+        <p:cNvPr id="1" name=""/>
+        <p:cNvGrpSpPr/>
+        <p:nvPr/>
+      </p:nvGrpSpPr>
+      <p:grpSpPr>
+        <a:xfrm>
+          <a:off x="0" y="0"/>
+          <a:ext cx="0" cy="0"/>
+          <a:chOff x="0" y="0"/>
+          <a:chExt cx="0" cy="0"/>
+        </a:xfrm>
+      </p:grpSpPr>
+      <p:sp>
+        <p:nvSpPr>
+          <p:cNvPr id="2" name="Slide Image Placeholder 1"/>
+          <p:cNvSpPr>
+            <a:spLocks noGrp="1" noRot="1" noChangeAspect="1"/>
+          </p:cNvSpPr>
+          <p:nvPr>
+            <p:ph type="sldImg"/>
+          </p:nvPr>
+        </p:nvSpPr>
+        <p:spPr/>
+      </p:sp>
+      <p:sp>
+        <p:nvSpPr>
+          <p:cNvPr id="3" name="Notes Placeholder 2"/>
+          <p:cNvSpPr>
+            <a:spLocks noGrp="1"/>
+          </p:cNvSpPr>
+          <p:nvPr>
+            <p:ph type="body" idx="1"/>
+          </p:nvPr>
+        </p:nvSpPr>
+        <p:spPr/>
+        <p:txBody>
+          <a:bodyPr/>
+          <a:lstStyle/>
+          <a:p>
+            <a:pPr>
+              <a:buFont typeface="Arial" panose="020B0604020202020204" pitchFamily="34" charset="0"/>
+              <a:buChar char="•"/>
+            </a:pPr>
+            <a:r>
+              <a:rPr lang="en-US" b="1" dirty="0"/>
+              <a:t>Teacher Notes:</a:t>
+            </a:r>
+            <a:endParaRPr lang="en-US" dirty="0"/>
+          </a:p>
+          <a:p>
+            <a:pPr marL="742950" lvl="1" indent="-285750">
+              <a:buFont typeface="Arial" panose="020B0604020202020204" pitchFamily="34" charset="0"/>
+              <a:buChar char="•"/>
+            </a:pPr>
+            <a:r>
+              <a:rPr lang="en-US" dirty="0"/>
+              <a:t>Detail the importance of assigning clear roles for data protection. Discuss how documentation (policies, procedures, incident response plans) is critical to managing risks.</a:t>
+            </a:r>
+          </a:p>
+          <a:p>
+            <a:pPr marL="742950" lvl="1" indent="-285750">
+              <a:buFont typeface="Arial" panose="020B0604020202020204" pitchFamily="34" charset="0"/>
+              <a:buChar char="•"/>
+            </a:pPr>
+            <a:r>
+              <a:rPr lang="en-US" dirty="0"/>
+              <a:t>Provide a walk-through of a typical incident response lifecycle and review case studies from sectors like healthcare or finance.</a:t>
+            </a:r>
+          </a:p>
+          <a:p>
+            <a:pPr>
+              <a:buFont typeface="Arial" panose="020B0604020202020204" pitchFamily="34" charset="0"/>
+              <a:buChar char="•"/>
+            </a:pPr>
+            <a:r>
+              <a:rPr lang="en-US" b="1" dirty="0"/>
+              <a:t>Resources:</a:t>
+            </a:r>
+            <a:endParaRPr lang="en-US" dirty="0"/>
+          </a:p>
+          <a:p>
+            <a:pPr marL="742950" lvl="1" indent="-285750">
+              <a:buFont typeface="Arial" panose="020B0604020202020204" pitchFamily="34" charset="0"/>
+              <a:buChar char="•"/>
+            </a:pPr>
+            <a:r>
+              <a:rPr lang="en-US" dirty="0"/>
+              <a:t>Templates or best-practice guides for data protection policies and incident response plans from sites such as SANS Institute or government cybersecurity agencies.</a:t>
+            </a:r>
+          </a:p>
+          <a:p>
+            <a:pPr marL="742950" lvl="1" indent="-285750">
+              <a:buFont typeface="Arial" panose="020B0604020202020204" pitchFamily="34" charset="0"/>
+              <a:buChar char="•"/>
+            </a:pPr>
+            <a:r>
+              <a:rPr lang="en-US" dirty="0"/>
+              <a:t>Checklists or flowcharts that illustrate the process of data handling and breach reporting.</a:t>
+            </a:r>
+          </a:p>
+          <a:p>
+            <a:pPr>
+              <a:buFont typeface="Arial" panose="020B0604020202020204" pitchFamily="34" charset="0"/>
+              <a:buChar char="•"/>
+            </a:pPr>
+            <a:r>
+              <a:rPr lang="en-US" b="1" dirty="0"/>
+              <a:t>Additional Reading:</a:t>
+            </a:r>
+            <a:endParaRPr lang="en-US" dirty="0"/>
+          </a:p>
+          <a:p>
+            <a:pPr marL="742950" lvl="1" indent="-285750">
+              <a:buFont typeface="Arial" panose="020B0604020202020204" pitchFamily="34" charset="0"/>
+              <a:buChar char="•"/>
+            </a:pPr>
+            <a:r>
+              <a:rPr lang="en-US" dirty="0"/>
+              <a:t>Whitepapers on building an effective incident response plan or case studies analyzing data breach impacts in regulated sectors.</a:t>
+            </a:r>
+          </a:p>
+          <a:p>
+            <a:endParaRPr lang="hr-HR" dirty="0"/>
+          </a:p>
+        </p:txBody>
+      </p:sp>
+      <p:sp>
+        <p:nvSpPr>
+          <p:cNvPr id="4" name="Slide Number Placeholder 3"/>
+          <p:cNvSpPr>
+            <a:spLocks noGrp="1"/>
+          </p:cNvSpPr>
+          <p:nvPr>
+            <p:ph type="sldNum" sz="quarter" idx="5"/>
+          </p:nvPr>
+        </p:nvSpPr>
+        <p:spPr/>
+        <p:txBody>
+          <a:bodyPr/>
+          <a:lstStyle/>
+          <a:p>
+            <a:fld id="{90A064B2-EFF6-4760-BE09-0DEDA56827BE}" type="slidenum">
+              <a:rPr lang="hr-HR" smtClean="0"/>
+              <a:t>4</a:t>
+            </a:fld>
+            <a:endParaRPr lang="hr-HR"/>
+          </a:p>
+        </p:txBody>
+      </p:sp>
+    </p:spTree>
+    <p:extLst>
+      <p:ext uri="{BB962C8B-B14F-4D97-AF65-F5344CB8AC3E}">
+        <p14:creationId xmlns:p14="http://schemas.microsoft.com/office/powerpoint/2010/main" val="2661164925"/>
+      </p:ext>
+    </p:extLst>
+  </p:cSld>
+  <p:clrMapOvr>
+    <a:masterClrMapping/>
+  </p:clrMapOvr>
+</p:notes>
+</file>
+
+<file path=ppt/notesSlides/notesSlide4.xml><?xml version="1.0" encoding="utf-8"?>
+<p:notes xmlns:a="http://schemas.openxmlformats.org/drawingml/2006/main" xmlns:r="http://schemas.openxmlformats.org/officeDocument/2006/relationships" xmlns:p="http://schemas.openxmlformats.org/presentationml/2006/main">
+  <p:cSld>
+    <p:spTree>
+      <p:nvGrpSpPr>
+        <p:cNvPr id="1" name=""/>
+        <p:cNvGrpSpPr/>
+        <p:nvPr/>
+      </p:nvGrpSpPr>
+      <p:grpSpPr>
+        <a:xfrm>
+          <a:off x="0" y="0"/>
+          <a:ext cx="0" cy="0"/>
+          <a:chOff x="0" y="0"/>
+          <a:chExt cx="0" cy="0"/>
+        </a:xfrm>
+      </p:grpSpPr>
+      <p:sp>
+        <p:nvSpPr>
+          <p:cNvPr id="2" name="Slide Image Placeholder 1"/>
+          <p:cNvSpPr>
+            <a:spLocks noGrp="1" noRot="1" noChangeAspect="1"/>
+          </p:cNvSpPr>
+          <p:nvPr>
+            <p:ph type="sldImg"/>
+          </p:nvPr>
+        </p:nvSpPr>
+        <p:spPr/>
+      </p:sp>
+      <p:sp>
+        <p:nvSpPr>
+          <p:cNvPr id="3" name="Notes Placeholder 2"/>
+          <p:cNvSpPr>
+            <a:spLocks noGrp="1"/>
+          </p:cNvSpPr>
+          <p:nvPr>
+            <p:ph type="body" idx="1"/>
+          </p:nvPr>
+        </p:nvSpPr>
+        <p:spPr/>
+        <p:txBody>
+          <a:bodyPr/>
+          <a:lstStyle/>
+          <a:p>
+            <a:pPr>
+              <a:buNone/>
+            </a:pPr>
+            <a:r>
+              <a:rPr lang="en-US" b="1" dirty="0"/>
+              <a:t>Teacher Notes:</a:t>
+            </a:r>
+            <a:endParaRPr lang="en-US" dirty="0"/>
+          </a:p>
+          <a:p>
+            <a:pPr>
+              <a:buFont typeface="Arial" panose="020B0604020202020204" pitchFamily="34" charset="0"/>
+              <a:buChar char="•"/>
+            </a:pPr>
+            <a:r>
+              <a:rPr lang="en-US" dirty="0"/>
+              <a:t>Detail the importance of assigning clear roles for data protection. Discuss how documentation (policies, procedures, incident response plans) is critical to managing risks.</a:t>
+            </a:r>
+          </a:p>
+          <a:p>
+            <a:pPr>
+              <a:buFont typeface="Arial" panose="020B0604020202020204" pitchFamily="34" charset="0"/>
+              <a:buChar char="•"/>
+            </a:pPr>
+            <a:r>
+              <a:rPr lang="en-US" dirty="0"/>
+              <a:t>Provide a walk-through of a typical incident response lifecycle and review case studies from sectors like healthcare or finance.</a:t>
+            </a:r>
+          </a:p>
+          <a:p>
+            <a:pPr>
+              <a:buNone/>
+            </a:pPr>
+            <a:r>
+              <a:rPr lang="en-US" b="1" dirty="0"/>
+              <a:t>Resources:</a:t>
+            </a:r>
+            <a:endParaRPr lang="en-US" dirty="0"/>
+          </a:p>
+          <a:p>
+            <a:pPr>
+              <a:buFont typeface="Arial" panose="020B0604020202020204" pitchFamily="34" charset="0"/>
+              <a:buChar char="•"/>
+            </a:pPr>
+            <a:r>
+              <a:rPr lang="en-US" dirty="0"/>
+              <a:t>Templates or best-practice guides for data protection policies and incident response plans from sites such as SANS Institute or government cybersecurity agencies.</a:t>
+            </a:r>
+          </a:p>
+          <a:p>
+            <a:pPr>
+              <a:buFont typeface="Arial" panose="020B0604020202020204" pitchFamily="34" charset="0"/>
+              <a:buChar char="•"/>
+            </a:pPr>
+            <a:r>
+              <a:rPr lang="en-US" dirty="0"/>
+              <a:t>Checklists or flowcharts that illustrate the process of data handling and breach reporting.</a:t>
+            </a:r>
+          </a:p>
+          <a:p>
+            <a:pPr>
+              <a:buNone/>
+            </a:pPr>
+            <a:r>
+              <a:rPr lang="en-US" b="1" dirty="0"/>
+              <a:t>Additional Reading (if applicable):</a:t>
+            </a:r>
+            <a:endParaRPr lang="en-US" dirty="0"/>
+          </a:p>
+          <a:p>
+            <a:pPr>
+              <a:buFont typeface="Arial" panose="020B0604020202020204" pitchFamily="34" charset="0"/>
+              <a:buChar char="•"/>
+            </a:pPr>
+            <a:r>
+              <a:rPr lang="en-US" dirty="0"/>
+              <a:t>Whitepapers on building an effective incident response plan or case studies analyzing data breach impacts in regulated sectors.</a:t>
+            </a:r>
+          </a:p>
+          <a:p>
+            <a:endParaRPr lang="hr-HR" dirty="0"/>
+          </a:p>
+        </p:txBody>
+      </p:sp>
+      <p:sp>
+        <p:nvSpPr>
+          <p:cNvPr id="4" name="Slide Number Placeholder 3"/>
+          <p:cNvSpPr>
+            <a:spLocks noGrp="1"/>
+          </p:cNvSpPr>
+          <p:nvPr>
+            <p:ph type="sldNum" sz="quarter" idx="5"/>
+          </p:nvPr>
+        </p:nvSpPr>
+        <p:spPr/>
+        <p:txBody>
+          <a:bodyPr/>
+          <a:lstStyle/>
+          <a:p>
+            <a:fld id="{90A064B2-EFF6-4760-BE09-0DEDA56827BE}" type="slidenum">
+              <a:rPr lang="hr-HR" smtClean="0"/>
+              <a:t>5</a:t>
+            </a:fld>
+            <a:endParaRPr lang="hr-HR"/>
+          </a:p>
+        </p:txBody>
+      </p:sp>
+    </p:spTree>
+    <p:extLst>
+      <p:ext uri="{BB962C8B-B14F-4D97-AF65-F5344CB8AC3E}">
+        <p14:creationId xmlns:p14="http://schemas.microsoft.com/office/powerpoint/2010/main" val="4152263575"/>
+      </p:ext>
+    </p:extLst>
+  </p:cSld>
+  <p:clrMapOvr>
+    <a:masterClrMapping/>
+  </p:clrMapOvr>
+</p:notes>
+</file>
+
+<file path=ppt/notesSlides/notesSlide5.xml><?xml version="1.0" encoding="utf-8"?>
+<p:notes xmlns:a="http://schemas.openxmlformats.org/drawingml/2006/main" xmlns:r="http://schemas.openxmlformats.org/officeDocument/2006/relationships" xmlns:p="http://schemas.openxmlformats.org/presentationml/2006/main">
+  <p:cSld>
+    <p:spTree>
+      <p:nvGrpSpPr>
+        <p:cNvPr id="1" name=""/>
+        <p:cNvGrpSpPr/>
+        <p:nvPr/>
+      </p:nvGrpSpPr>
+      <p:grpSpPr>
+        <a:xfrm>
+          <a:off x="0" y="0"/>
+          <a:ext cx="0" cy="0"/>
+          <a:chOff x="0" y="0"/>
+          <a:chExt cx="0" cy="0"/>
+        </a:xfrm>
+      </p:grpSpPr>
+      <p:sp>
+        <p:nvSpPr>
+          <p:cNvPr id="2" name="Slide Image Placeholder 1"/>
+          <p:cNvSpPr>
+            <a:spLocks noGrp="1" noRot="1" noChangeAspect="1"/>
+          </p:cNvSpPr>
+          <p:nvPr>
+            <p:ph type="sldImg"/>
+          </p:nvPr>
+        </p:nvSpPr>
+        <p:spPr/>
+      </p:sp>
+      <p:sp>
+        <p:nvSpPr>
+          <p:cNvPr id="3" name="Notes Placeholder 2"/>
+          <p:cNvSpPr>
+            <a:spLocks noGrp="1"/>
+          </p:cNvSpPr>
+          <p:nvPr>
+            <p:ph type="body" idx="1"/>
+          </p:nvPr>
+        </p:nvSpPr>
+        <p:spPr/>
+        <p:txBody>
+          <a:bodyPr/>
+          <a:lstStyle/>
+          <a:p>
+            <a:pPr>
+              <a:buNone/>
+            </a:pPr>
+            <a:r>
+              <a:rPr lang="en-US" b="1" dirty="0"/>
+              <a:t>Teacher Notes:</a:t>
+            </a:r>
+            <a:endParaRPr lang="en-US" dirty="0"/>
+          </a:p>
+          <a:p>
+            <a:pPr>
+              <a:buFont typeface="Arial" panose="020B0604020202020204" pitchFamily="34" charset="0"/>
+              <a:buChar char="•"/>
+            </a:pPr>
+            <a:r>
+              <a:rPr lang="en-US" dirty="0"/>
+              <a:t>Differentiate between the speed and efficiency of symmetric encryption versus the enhanced security (at the cost of speed) provided by asymmetric encryption.</a:t>
+            </a:r>
+          </a:p>
+          <a:p>
+            <a:pPr>
+              <a:buFont typeface="Arial" panose="020B0604020202020204" pitchFamily="34" charset="0"/>
+              <a:buChar char="•"/>
+            </a:pPr>
+            <a:r>
+              <a:rPr lang="en-US" dirty="0"/>
+              <a:t>Consider including a live demonstration or a simplified diagram that illustrates how public and private keys work together.</a:t>
+            </a:r>
+          </a:p>
+          <a:p>
+            <a:pPr>
+              <a:buNone/>
+            </a:pPr>
+            <a:r>
+              <a:rPr lang="en-US" b="1" dirty="0"/>
+              <a:t>Resources:</a:t>
+            </a:r>
+            <a:endParaRPr lang="en-US" dirty="0"/>
+          </a:p>
+          <a:p>
+            <a:pPr>
+              <a:buFont typeface="Arial" panose="020B0604020202020204" pitchFamily="34" charset="0"/>
+              <a:buChar char="•"/>
+            </a:pPr>
+            <a:r>
+              <a:rPr lang="en-US" dirty="0"/>
+              <a:t>Beginner-friendly online tutorials like “Crypto101” that clearly explain the basics of cryptography.</a:t>
+            </a:r>
+          </a:p>
+          <a:p>
+            <a:pPr>
+              <a:buFont typeface="Arial" panose="020B0604020202020204" pitchFamily="34" charset="0"/>
+              <a:buChar char="•"/>
+            </a:pPr>
+            <a:r>
+              <a:rPr lang="en-US" dirty="0"/>
+              <a:t>Interactive encryption tools or simulations available on educational websites to visualize encryption processes in real time.</a:t>
+            </a:r>
+          </a:p>
+          <a:p>
+            <a:pPr>
+              <a:buNone/>
+            </a:pPr>
+            <a:r>
+              <a:rPr lang="en-US" b="1" dirty="0"/>
+              <a:t>Additional Reading (if applicable):</a:t>
+            </a:r>
+            <a:endParaRPr lang="en-US" dirty="0"/>
+          </a:p>
+          <a:p>
+            <a:pPr>
+              <a:buFont typeface="Arial" panose="020B0604020202020204" pitchFamily="34" charset="0"/>
+              <a:buChar char="•"/>
+            </a:pPr>
+            <a:r>
+              <a:rPr lang="en-US" dirty="0"/>
+              <a:t>Articles or research papers discussing recent developments in encryption standards and the evolving security landscape regarding encryption practices.</a:t>
+            </a:r>
+          </a:p>
+          <a:p>
+            <a:endParaRPr lang="hr-HR" dirty="0"/>
+          </a:p>
+        </p:txBody>
+      </p:sp>
+      <p:sp>
+        <p:nvSpPr>
+          <p:cNvPr id="4" name="Slide Number Placeholder 3"/>
+          <p:cNvSpPr>
+            <a:spLocks noGrp="1"/>
+          </p:cNvSpPr>
+          <p:nvPr>
+            <p:ph type="sldNum" sz="quarter" idx="5"/>
+          </p:nvPr>
+        </p:nvSpPr>
+        <p:spPr/>
+        <p:txBody>
+          <a:bodyPr/>
+          <a:lstStyle/>
+          <a:p>
+            <a:fld id="{90A064B2-EFF6-4760-BE09-0DEDA56827BE}" type="slidenum">
+              <a:rPr lang="hr-HR" smtClean="0"/>
+              <a:t>6</a:t>
+            </a:fld>
+            <a:endParaRPr lang="hr-HR"/>
+          </a:p>
+        </p:txBody>
+      </p:sp>
+    </p:spTree>
+    <p:extLst>
+      <p:ext uri="{BB962C8B-B14F-4D97-AF65-F5344CB8AC3E}">
+        <p14:creationId xmlns:p14="http://schemas.microsoft.com/office/powerpoint/2010/main" val="1617239218"/>
+      </p:ext>
+    </p:extLst>
+  </p:cSld>
+  <p:clrMapOvr>
+    <a:masterClrMapping/>
+  </p:clrMapOvr>
+</p:notes>
+</file>
+
+<file path=ppt/notesSlides/notesSlide6.xml><?xml version="1.0" encoding="utf-8"?>
+<p:notes xmlns:a="http://schemas.openxmlformats.org/drawingml/2006/main" xmlns:r="http://schemas.openxmlformats.org/officeDocument/2006/relationships" xmlns:p="http://schemas.openxmlformats.org/presentationml/2006/main">
+  <p:cSld>
+    <p:spTree>
+      <p:nvGrpSpPr>
+        <p:cNvPr id="1" name=""/>
+        <p:cNvGrpSpPr/>
+        <p:nvPr/>
+      </p:nvGrpSpPr>
+      <p:grpSpPr>
+        <a:xfrm>
+          <a:off x="0" y="0"/>
+          <a:ext cx="0" cy="0"/>
+          <a:chOff x="0" y="0"/>
+          <a:chExt cx="0" cy="0"/>
+        </a:xfrm>
+      </p:grpSpPr>
+      <p:sp>
+        <p:nvSpPr>
+          <p:cNvPr id="2" name="Slide Image Placeholder 1"/>
+          <p:cNvSpPr>
+            <a:spLocks noGrp="1" noRot="1" noChangeAspect="1"/>
+          </p:cNvSpPr>
+          <p:nvPr>
+            <p:ph type="sldImg"/>
+          </p:nvPr>
+        </p:nvSpPr>
+        <p:spPr/>
+      </p:sp>
+      <p:sp>
+        <p:nvSpPr>
+          <p:cNvPr id="3" name="Notes Placeholder 2"/>
+          <p:cNvSpPr>
+            <a:spLocks noGrp="1"/>
+          </p:cNvSpPr>
+          <p:nvPr>
+            <p:ph type="body" idx="1"/>
+          </p:nvPr>
+        </p:nvSpPr>
+        <p:spPr/>
+        <p:txBody>
+          <a:bodyPr/>
+          <a:lstStyle/>
+          <a:p>
+            <a:pPr>
+              <a:buNone/>
+            </a:pPr>
+            <a:r>
+              <a:rPr lang="en-US" b="1" dirty="0"/>
+              <a:t>Teacher Notes:</a:t>
+            </a:r>
+            <a:endParaRPr lang="en-US" dirty="0"/>
+          </a:p>
+          <a:p>
+            <a:pPr>
+              <a:buFont typeface="Arial" panose="020B0604020202020204" pitchFamily="34" charset="0"/>
+              <a:buChar char="•"/>
+            </a:pPr>
+            <a:r>
+              <a:rPr lang="en-US" dirty="0"/>
+              <a:t>Illustrate the concept of a one-way function by comparing hashing with reversible encryption.</a:t>
+            </a:r>
+          </a:p>
+          <a:p>
+            <a:pPr>
+              <a:buFont typeface="Arial" panose="020B0604020202020204" pitchFamily="34" charset="0"/>
+              <a:buChar char="•"/>
+            </a:pPr>
+            <a:r>
+              <a:rPr lang="en-US" dirty="0"/>
+              <a:t>Discuss why salting passwords is necessary to prevent attacks (e.g., rainbow tables).</a:t>
+            </a:r>
+          </a:p>
+          <a:p>
+            <a:pPr>
+              <a:buFont typeface="Arial" panose="020B0604020202020204" pitchFamily="34" charset="0"/>
+              <a:buChar char="•"/>
+            </a:pPr>
+            <a:r>
+              <a:rPr lang="en-US" dirty="0"/>
+              <a:t>Use real-world examples of how compromised hash functions in legacy systems led to security breaches.</a:t>
+            </a:r>
+          </a:p>
+          <a:p>
+            <a:pPr>
+              <a:buNone/>
+            </a:pPr>
+            <a:r>
+              <a:rPr lang="en-US" b="1" dirty="0"/>
+              <a:t>Resources:</a:t>
+            </a:r>
+            <a:endParaRPr lang="en-US" dirty="0"/>
+          </a:p>
+          <a:p>
+            <a:pPr>
+              <a:buFont typeface="Arial" panose="020B0604020202020204" pitchFamily="34" charset="0"/>
+              <a:buChar char="•"/>
+            </a:pPr>
+            <a:r>
+              <a:rPr lang="en-US" dirty="0"/>
+              <a:t>OWASP guidelines on secure password storage and hashing best practices.</a:t>
+            </a:r>
+          </a:p>
+          <a:p>
+            <a:pPr>
+              <a:buFont typeface="Arial" panose="020B0604020202020204" pitchFamily="34" charset="0"/>
+              <a:buChar char="•"/>
+            </a:pPr>
+            <a:r>
+              <a:rPr lang="en-US" dirty="0"/>
+              <a:t>Online demos that allow students to see how different inputs yield unique hashes.</a:t>
+            </a:r>
+          </a:p>
+          <a:p>
+            <a:pPr>
+              <a:buNone/>
+            </a:pPr>
+            <a:r>
+              <a:rPr lang="en-US" b="1" dirty="0"/>
+              <a:t>Additional Reading (if applicable):</a:t>
+            </a:r>
+            <a:endParaRPr lang="en-US" dirty="0"/>
+          </a:p>
+          <a:p>
+            <a:pPr>
+              <a:buFont typeface="Arial" panose="020B0604020202020204" pitchFamily="34" charset="0"/>
+              <a:buChar char="•"/>
+            </a:pPr>
+            <a:r>
+              <a:rPr lang="en-US" dirty="0"/>
+              <a:t>In-depth articles that analyze modern hash functions versus older, vulnerable ones, plus comparisons and recommendations for best practices.</a:t>
+            </a:r>
+          </a:p>
+          <a:p>
+            <a:endParaRPr lang="hr-HR" dirty="0"/>
+          </a:p>
+        </p:txBody>
+      </p:sp>
+      <p:sp>
+        <p:nvSpPr>
+          <p:cNvPr id="4" name="Slide Number Placeholder 3"/>
+          <p:cNvSpPr>
+            <a:spLocks noGrp="1"/>
+          </p:cNvSpPr>
+          <p:nvPr>
+            <p:ph type="sldNum" sz="quarter" idx="5"/>
+          </p:nvPr>
+        </p:nvSpPr>
+        <p:spPr/>
+        <p:txBody>
+          <a:bodyPr/>
+          <a:lstStyle/>
+          <a:p>
+            <a:fld id="{90A064B2-EFF6-4760-BE09-0DEDA56827BE}" type="slidenum">
+              <a:rPr lang="hr-HR" smtClean="0"/>
+              <a:t>7</a:t>
+            </a:fld>
+            <a:endParaRPr lang="hr-HR"/>
+          </a:p>
+        </p:txBody>
+      </p:sp>
+    </p:spTree>
+    <p:extLst>
+      <p:ext uri="{BB962C8B-B14F-4D97-AF65-F5344CB8AC3E}">
+        <p14:creationId xmlns:p14="http://schemas.microsoft.com/office/powerpoint/2010/main" val="3772709612"/>
+      </p:ext>
+    </p:extLst>
+  </p:cSld>
+  <p:clrMapOvr>
+    <a:masterClrMapping/>
+  </p:clrMapOvr>
+</p:notes>
+</file>
+
+<file path=ppt/notesSlides/notesSlide7.xml><?xml version="1.0" encoding="utf-8"?>
+<p:notes xmlns:a="http://schemas.openxmlformats.org/drawingml/2006/main" xmlns:r="http://schemas.openxmlformats.org/officeDocument/2006/relationships" xmlns:p="http://schemas.openxmlformats.org/presentationml/2006/main">
+  <p:cSld>
+    <p:spTree>
+      <p:nvGrpSpPr>
+        <p:cNvPr id="1" name=""/>
+        <p:cNvGrpSpPr/>
+        <p:nvPr/>
+      </p:nvGrpSpPr>
+      <p:grpSpPr>
+        <a:xfrm>
+          <a:off x="0" y="0"/>
+          <a:ext cx="0" cy="0"/>
+          <a:chOff x="0" y="0"/>
+          <a:chExt cx="0" cy="0"/>
+        </a:xfrm>
+      </p:grpSpPr>
+      <p:sp>
+        <p:nvSpPr>
+          <p:cNvPr id="2" name="Slide Image Placeholder 1"/>
+          <p:cNvSpPr>
+            <a:spLocks noGrp="1" noRot="1" noChangeAspect="1"/>
+          </p:cNvSpPr>
+          <p:nvPr>
+            <p:ph type="sldImg"/>
+          </p:nvPr>
+        </p:nvSpPr>
+        <p:spPr/>
+      </p:sp>
+      <p:sp>
+        <p:nvSpPr>
+          <p:cNvPr id="3" name="Notes Placeholder 2"/>
+          <p:cNvSpPr>
+            <a:spLocks noGrp="1"/>
+          </p:cNvSpPr>
+          <p:nvPr>
+            <p:ph type="body" idx="1"/>
+          </p:nvPr>
+        </p:nvSpPr>
+        <p:spPr/>
+        <p:txBody>
+          <a:bodyPr/>
+          <a:lstStyle/>
+          <a:p>
+            <a:pPr>
+              <a:buNone/>
+            </a:pPr>
+            <a:r>
+              <a:rPr lang="en-US" b="1" dirty="0"/>
+              <a:t>Teacher Notes:</a:t>
+            </a:r>
+            <a:endParaRPr lang="en-US" dirty="0"/>
+          </a:p>
+          <a:p>
+            <a:pPr>
+              <a:buFont typeface="Arial" panose="020B0604020202020204" pitchFamily="34" charset="0"/>
+              <a:buChar char="•"/>
+            </a:pPr>
+            <a:r>
+              <a:rPr lang="en-US" dirty="0"/>
+              <a:t>Discuss the role of each security measure and how they complement each other to form a layered defense.</a:t>
+            </a:r>
+          </a:p>
+          <a:p>
+            <a:pPr>
+              <a:buFont typeface="Arial" panose="020B0604020202020204" pitchFamily="34" charset="0"/>
+              <a:buChar char="•"/>
+            </a:pPr>
+            <a:r>
+              <a:rPr lang="en-US" dirty="0"/>
+              <a:t>Introduce a discussion on emerging threats and how traditional measures need to evolve (e.g., next-generation firewalls, behavioral analysis in IDS).</a:t>
+            </a:r>
+          </a:p>
+          <a:p>
+            <a:pPr>
+              <a:buFont typeface="Arial" panose="020B0604020202020204" pitchFamily="34" charset="0"/>
+              <a:buChar char="•"/>
+            </a:pPr>
+            <a:r>
+              <a:rPr lang="en-US" dirty="0"/>
+              <a:t>Consider a case study analysis of a security breach that failed due to a lapse in one or more of these defenses.</a:t>
+            </a:r>
+          </a:p>
+          <a:p>
+            <a:pPr>
+              <a:buNone/>
+            </a:pPr>
+            <a:r>
+              <a:rPr lang="en-US" b="1" dirty="0"/>
+              <a:t>Resources:</a:t>
+            </a:r>
+            <a:endParaRPr lang="en-US" dirty="0"/>
+          </a:p>
+          <a:p>
+            <a:pPr>
+              <a:buFont typeface="Arial" panose="020B0604020202020204" pitchFamily="34" charset="0"/>
+              <a:buChar char="•"/>
+            </a:pPr>
+            <a:r>
+              <a:rPr lang="en-US" dirty="0"/>
+              <a:t>Whitepapers and technical briefings from cybersecurity firms that outline current threat landscapes.</a:t>
+            </a:r>
+          </a:p>
+          <a:p>
+            <a:pPr>
+              <a:buFont typeface="Arial" panose="020B0604020202020204" pitchFamily="34" charset="0"/>
+              <a:buChar char="•"/>
+            </a:pPr>
+            <a:r>
+              <a:rPr lang="en-US" dirty="0"/>
+              <a:t>Videos or recorded webinars that explore the functioning of firewalls and IDS/IPS in depth.</a:t>
+            </a:r>
+          </a:p>
+          <a:p>
+            <a:pPr>
+              <a:buNone/>
+            </a:pPr>
+            <a:r>
+              <a:rPr lang="en-US" b="1" dirty="0"/>
+              <a:t>Additional Reading (if applicable):</a:t>
+            </a:r>
+            <a:endParaRPr lang="en-US" dirty="0"/>
+          </a:p>
+          <a:p>
+            <a:pPr>
+              <a:buFont typeface="Arial" panose="020B0604020202020204" pitchFamily="34" charset="0"/>
+              <a:buChar char="•"/>
+            </a:pPr>
+            <a:r>
+              <a:rPr lang="en-US" dirty="0"/>
+              <a:t>Up-to-date research articles or industry reports on cyber threats and defenses—this can help spark advanced discussions on evolving security trends.</a:t>
+            </a:r>
+          </a:p>
+          <a:p>
+            <a:endParaRPr lang="hr-HR" dirty="0"/>
+          </a:p>
+        </p:txBody>
+      </p:sp>
+      <p:sp>
+        <p:nvSpPr>
+          <p:cNvPr id="4" name="Slide Number Placeholder 3"/>
+          <p:cNvSpPr>
+            <a:spLocks noGrp="1"/>
+          </p:cNvSpPr>
+          <p:nvPr>
+            <p:ph type="sldNum" sz="quarter" idx="5"/>
+          </p:nvPr>
+        </p:nvSpPr>
+        <p:spPr/>
+        <p:txBody>
+          <a:bodyPr/>
+          <a:lstStyle/>
+          <a:p>
+            <a:fld id="{90A064B2-EFF6-4760-BE09-0DEDA56827BE}" type="slidenum">
+              <a:rPr lang="hr-HR" smtClean="0"/>
+              <a:t>8</a:t>
+            </a:fld>
+            <a:endParaRPr lang="hr-HR"/>
+          </a:p>
+        </p:txBody>
+      </p:sp>
+    </p:spTree>
+    <p:extLst>
+      <p:ext uri="{BB962C8B-B14F-4D97-AF65-F5344CB8AC3E}">
+        <p14:creationId xmlns:p14="http://schemas.microsoft.com/office/powerpoint/2010/main" val="563307436"/>
+      </p:ext>
+    </p:extLst>
+  </p:cSld>
+  <p:clrMapOvr>
+    <a:masterClrMapping/>
+  </p:clrMapOvr>
+</p:notes>
+</file>
+
+<file path=ppt/notesSlides/notesSlide8.xml><?xml version="1.0" encoding="utf-8"?>
+<p:notes xmlns:a="http://schemas.openxmlformats.org/drawingml/2006/main" xmlns:r="http://schemas.openxmlformats.org/officeDocument/2006/relationships" xmlns:p="http://schemas.openxmlformats.org/presentationml/2006/main">
+  <p:cSld>
+    <p:spTree>
+      <p:nvGrpSpPr>
+        <p:cNvPr id="1" name=""/>
+        <p:cNvGrpSpPr/>
+        <p:nvPr/>
+      </p:nvGrpSpPr>
+      <p:grpSpPr>
+        <a:xfrm>
+          <a:off x="0" y="0"/>
+          <a:ext cx="0" cy="0"/>
+          <a:chOff x="0" y="0"/>
+          <a:chExt cx="0" cy="0"/>
+        </a:xfrm>
+      </p:grpSpPr>
+      <p:sp>
+        <p:nvSpPr>
+          <p:cNvPr id="2" name="Slide Image Placeholder 1"/>
+          <p:cNvSpPr>
+            <a:spLocks noGrp="1" noRot="1" noChangeAspect="1"/>
+          </p:cNvSpPr>
+          <p:nvPr>
+            <p:ph type="sldImg"/>
+          </p:nvPr>
+        </p:nvSpPr>
+        <p:spPr/>
+      </p:sp>
+      <p:sp>
+        <p:nvSpPr>
+          <p:cNvPr id="3" name="Notes Placeholder 2"/>
+          <p:cNvSpPr>
+            <a:spLocks noGrp="1"/>
+          </p:cNvSpPr>
+          <p:nvPr>
+            <p:ph type="body" idx="1"/>
+          </p:nvPr>
+        </p:nvSpPr>
+        <p:spPr/>
+        <p:txBody>
+          <a:bodyPr/>
+          <a:lstStyle/>
+          <a:p>
+            <a:pPr>
+              <a:buNone/>
+            </a:pPr>
+            <a:r>
+              <a:rPr lang="en-US" b="1" dirty="0"/>
+              <a:t>Teacher Notes:</a:t>
+            </a:r>
+            <a:endParaRPr lang="en-US" dirty="0"/>
+          </a:p>
+          <a:p>
+            <a:pPr>
+              <a:buFont typeface="Arial" panose="020B0604020202020204" pitchFamily="34" charset="0"/>
+              <a:buChar char="•"/>
+            </a:pPr>
+            <a:r>
+              <a:rPr lang="en-US" dirty="0"/>
+              <a:t>Outline the key components of legal frameworks like GDPR and how they enforce accountability through fines and public scrutiny.</a:t>
+            </a:r>
+          </a:p>
+          <a:p>
+            <a:pPr>
+              <a:buFont typeface="Arial" panose="020B0604020202020204" pitchFamily="34" charset="0"/>
+              <a:buChar char="•"/>
+            </a:pPr>
+            <a:r>
+              <a:rPr lang="en-US" dirty="0"/>
+              <a:t>Explain the importance of regular audits and continuous monitoring in maintaining compliance.</a:t>
+            </a:r>
+          </a:p>
+          <a:p>
+            <a:pPr>
+              <a:buFont typeface="Arial" panose="020B0604020202020204" pitchFamily="34" charset="0"/>
+              <a:buChar char="•"/>
+            </a:pPr>
+            <a:r>
+              <a:rPr lang="en-US" dirty="0"/>
+              <a:t>Discuss the global impact of such regulations and how organizations adapt their security practices accordingly.</a:t>
+            </a:r>
+          </a:p>
+          <a:p>
+            <a:pPr>
+              <a:buNone/>
+            </a:pPr>
+            <a:r>
+              <a:rPr lang="en-US" b="1" dirty="0"/>
+              <a:t>Resources:</a:t>
+            </a:r>
+            <a:endParaRPr lang="en-US" dirty="0"/>
+          </a:p>
+          <a:p>
+            <a:pPr>
+              <a:buFont typeface="Arial" panose="020B0604020202020204" pitchFamily="34" charset="0"/>
+              <a:buChar char="•"/>
+            </a:pPr>
+            <a:r>
+              <a:rPr lang="en-US" dirty="0"/>
+              <a:t>Official GDPR documentation and guidelines available from European data protection authorities.</a:t>
+            </a:r>
+          </a:p>
+          <a:p>
+            <a:pPr>
+              <a:buFont typeface="Arial" panose="020B0604020202020204" pitchFamily="34" charset="0"/>
+              <a:buChar char="•"/>
+            </a:pPr>
+            <a:r>
+              <a:rPr lang="en-US" dirty="0"/>
+              <a:t>Online courses or webinars on compliance, available from platforms like Coursera or edX, that focus on real-world applications.</a:t>
+            </a:r>
+          </a:p>
+          <a:p>
+            <a:pPr>
+              <a:buNone/>
+            </a:pPr>
+            <a:r>
+              <a:rPr lang="en-US" b="1" dirty="0"/>
+              <a:t>Additional Reading (if applicable):</a:t>
+            </a:r>
+            <a:endParaRPr lang="en-US" dirty="0"/>
+          </a:p>
+          <a:p>
+            <a:pPr>
+              <a:buFont typeface="Arial" panose="020B0604020202020204" pitchFamily="34" charset="0"/>
+              <a:buChar char="•"/>
+            </a:pPr>
+            <a:r>
+              <a:rPr lang="en-US" dirty="0"/>
+              <a:t>Detailed case studies or legal analyses on high-profile data breaches, including critical evaluations of the British Airways case, and resources on setting up robust compliance frameworks.</a:t>
+            </a:r>
+          </a:p>
+          <a:p>
+            <a:endParaRPr lang="hr-HR" dirty="0"/>
+          </a:p>
+        </p:txBody>
+      </p:sp>
+      <p:sp>
+        <p:nvSpPr>
+          <p:cNvPr id="4" name="Slide Number Placeholder 3"/>
+          <p:cNvSpPr>
+            <a:spLocks noGrp="1"/>
+          </p:cNvSpPr>
+          <p:nvPr>
+            <p:ph type="sldNum" sz="quarter" idx="5"/>
+          </p:nvPr>
+        </p:nvSpPr>
+        <p:spPr/>
+        <p:txBody>
+          <a:bodyPr/>
+          <a:lstStyle/>
+          <a:p>
+            <a:fld id="{90A064B2-EFF6-4760-BE09-0DEDA56827BE}" type="slidenum">
+              <a:rPr lang="hr-HR" smtClean="0"/>
+              <a:t>9</a:t>
+            </a:fld>
+            <a:endParaRPr lang="hr-HR"/>
+          </a:p>
+        </p:txBody>
+      </p:sp>
+    </p:spTree>
+    <p:extLst>
+      <p:ext uri="{BB962C8B-B14F-4D97-AF65-F5344CB8AC3E}">
+        <p14:creationId xmlns:p14="http://schemas.microsoft.com/office/powerpoint/2010/main" val="149049671"/>
+      </p:ext>
+    </p:extLst>
+  </p:cSld>
+  <p:clrMapOvr>
+    <a:masterClrMapping/>
+  </p:clrMapOvr>
+</p:notes>
 </file>
 
 <file path=ppt/slideLayouts/slideLayout1.xml><?xml version="1.0" encoding="utf-8"?>
@@ -2699,7 +4063,7 @@
           <a:p>
             <a:fld id="{6963B997-549E-41F4-A1E4-B0CF42B49EF1}" type="datetimeFigureOut">
               <a:rPr lang="hr-HR" smtClean="0"/>
-              <a:t>13.3.2025.</a:t>
+              <a:t>16.4.2025.</a:t>
             </a:fld>
             <a:endParaRPr lang="hr-HR"/>
           </a:p>
@@ -3868,7 +5232,7 @@
           <p:nvPr/>
         </p:nvPicPr>
         <p:blipFill>
-          <a:blip r:embed="rId2"/>
+          <a:blip r:embed="rId3"/>
           <a:stretch>
             <a:fillRect/>
           </a:stretch>
@@ -6116,7 +7480,7 @@
           <p:nvPr/>
         </p:nvPicPr>
         <p:blipFill>
-          <a:blip r:embed="rId2"/>
+          <a:blip r:embed="rId3"/>
           <a:stretch>
             <a:fillRect/>
           </a:stretch>
@@ -7371,7 +8735,7 @@
           <p:nvPr/>
         </p:nvPicPr>
         <p:blipFill>
-          <a:blip r:embed="rId2"/>
+          <a:blip r:embed="rId3"/>
           <a:stretch>
             <a:fillRect/>
           </a:stretch>

</xml_diff>